<commit_message>
Udah selesai kurang site map, ga tau d folder apa, kendala dan maintenance
</commit_message>
<xml_diff>
--- a/dokumen/PointerSchool.pptx
+++ b/dokumen/PointerSchool.pptx
@@ -20,6 +20,9 @@
     <p:sldId id="268" r:id="rId14"/>
     <p:sldId id="270" r:id="rId15"/>
     <p:sldId id="267" r:id="rId16"/>
+    <p:sldId id="272" r:id="rId17"/>
+    <p:sldId id="271" r:id="rId18"/>
+    <p:sldId id="273" r:id="rId19"/>
   </p:sldIdLst>
   <p:sldSz cx="12192000" cy="6858000"/>
   <p:notesSz cx="6858000" cy="9144000"/>
@@ -4437,7 +4440,7 @@
           <a:lstStyle/>
           <a:p>
             <a:r>
-              <a:rPr lang="en-US" b="1" dirty="0" smtClean="0">
+              <a:rPr lang="en-US" b="1" dirty="0" err="1" smtClean="0">
                 <a:solidFill>
                   <a:schemeClr val="bg2">
                     <a:lumMod val="10000"/>
@@ -4445,7 +4448,18 @@
                 </a:solidFill>
                 <a:latin typeface="Century Gothic" panose="020B0502020202020204" pitchFamily="34" charset="0"/>
               </a:rPr>
-              <a:t>Deliverables : user manual</a:t>
+              <a:t>Realisasi</a:t>
+            </a:r>
+            <a:r>
+              <a:rPr lang="en-US" b="1" dirty="0" smtClean="0">
+                <a:solidFill>
+                  <a:schemeClr val="bg2">
+                    <a:lumMod val="10000"/>
+                  </a:schemeClr>
+                </a:solidFill>
+                <a:latin typeface="Century Gothic" panose="020B0502020202020204" pitchFamily="34" charset="0"/>
+              </a:rPr>
+              <a:t> RPPL</a:t>
             </a:r>
             <a:endParaRPr lang="en-US" b="1" dirty="0">
               <a:solidFill>
@@ -4460,21 +4474,263 @@
       </p:sp>
       <p:pic>
         <p:nvPicPr>
+          <p:cNvPr id="10" name="Picture 9"/>
+          <p:cNvPicPr>
+            <a:picLocks noChangeAspect="1"/>
+          </p:cNvPicPr>
+          <p:nvPr/>
+        </p:nvPicPr>
+        <p:blipFill>
+          <a:blip r:embed="rId3"/>
+          <a:stretch>
+            <a:fillRect/>
+          </a:stretch>
+        </p:blipFill>
+        <p:spPr>
+          <a:xfrm>
+            <a:off x="487816" y="2388113"/>
+            <a:ext cx="5315857" cy="4289528"/>
+          </a:xfrm>
+          <a:prstGeom prst="rect">
+            <a:avLst/>
+          </a:prstGeom>
+        </p:spPr>
+      </p:pic>
+      <p:sp>
+        <p:nvSpPr>
+          <p:cNvPr id="12" name="TextBox 11"/>
+          <p:cNvSpPr txBox="1"/>
+          <p:nvPr/>
+        </p:nvSpPr>
+        <p:spPr>
+          <a:xfrm>
+            <a:off x="487816" y="1725592"/>
+            <a:ext cx="8797018" cy="461665"/>
+          </a:xfrm>
+          <a:prstGeom prst="rect">
+            <a:avLst/>
+          </a:prstGeom>
+          <a:noFill/>
+        </p:spPr>
+        <p:txBody>
+          <a:bodyPr wrap="square" rtlCol="0">
+            <a:spAutoFit/>
+          </a:bodyPr>
+          <a:lstStyle/>
+          <a:p>
+            <a:pPr lvl="0"/>
+            <a:r>
+              <a:rPr lang="en-US" sz="2400" u="sng" dirty="0" smtClean="0">
+                <a:solidFill>
+                  <a:schemeClr val="bg1"/>
+                </a:solidFill>
+              </a:rPr>
+              <a:t>Timeline</a:t>
+            </a:r>
+          </a:p>
+        </p:txBody>
+      </p:sp>
+      <p:pic>
+        <p:nvPicPr>
+          <p:cNvPr id="11" name="Picture 10"/>
+          <p:cNvPicPr>
+            <a:picLocks noChangeAspect="1"/>
+          </p:cNvPicPr>
+          <p:nvPr/>
+        </p:nvPicPr>
+        <p:blipFill>
+          <a:blip r:embed="rId4"/>
+          <a:stretch>
+            <a:fillRect/>
+          </a:stretch>
+        </p:blipFill>
+        <p:spPr>
+          <a:xfrm>
+            <a:off x="6096000" y="3555955"/>
+            <a:ext cx="4564516" cy="2995657"/>
+          </a:xfrm>
+          <a:prstGeom prst="rect">
+            <a:avLst/>
+          </a:prstGeom>
+        </p:spPr>
+      </p:pic>
+    </p:spTree>
+    <p:extLst>
+      <p:ext uri="{BB962C8B-B14F-4D97-AF65-F5344CB8AC3E}">
+        <p14:creationId xmlns:p14="http://schemas.microsoft.com/office/powerpoint/2010/main" val="3541494613"/>
+      </p:ext>
+    </p:extLst>
+  </p:cSld>
+  <p:clrMapOvr>
+    <a:masterClrMapping/>
+  </p:clrMapOvr>
+  <p:timing>
+    <p:tnLst>
+      <p:par>
+        <p:cTn id="1" dur="indefinite" restart="never" nodeType="tmRoot"/>
+      </p:par>
+    </p:tnLst>
+  </p:timing>
+</p:sld>
+</file>
+
+<file path=ppt/slides/slide16.xml><?xml version="1.0" encoding="utf-8"?>
+<p:sld xmlns:a="http://schemas.openxmlformats.org/drawingml/2006/main" xmlns:r="http://schemas.openxmlformats.org/officeDocument/2006/relationships" xmlns:p="http://schemas.openxmlformats.org/presentationml/2006/main">
+  <p:cSld>
+    <p:bg>
+      <p:bgPr>
+        <a:blipFill dpi="0" rotWithShape="1">
+          <a:blip r:embed="rId2">
+            <a:lum/>
+          </a:blip>
+          <a:srcRect/>
+          <a:stretch>
+            <a:fillRect/>
+          </a:stretch>
+        </a:blipFill>
+        <a:effectLst/>
+      </p:bgPr>
+    </p:bg>
+    <p:spTree>
+      <p:nvGrpSpPr>
+        <p:cNvPr id="1" name=""/>
+        <p:cNvGrpSpPr/>
+        <p:nvPr/>
+      </p:nvGrpSpPr>
+      <p:grpSpPr>
+        <a:xfrm>
+          <a:off x="0" y="0"/>
+          <a:ext cx="0" cy="0"/>
+          <a:chOff x="0" y="0"/>
+          <a:chExt cx="0" cy="0"/>
+        </a:xfrm>
+      </p:grpSpPr>
+      <p:sp>
+        <p:nvSpPr>
+          <p:cNvPr id="2" name="Title 1"/>
+          <p:cNvSpPr>
+            <a:spLocks noGrp="1"/>
+          </p:cNvSpPr>
+          <p:nvPr>
+            <p:ph type="title"/>
+          </p:nvPr>
+        </p:nvSpPr>
+        <p:spPr>
+          <a:xfrm>
+            <a:off x="838200" y="365125"/>
+            <a:ext cx="10515600" cy="1044575"/>
+          </a:xfrm>
+        </p:spPr>
+        <p:txBody>
+          <a:bodyPr/>
+          <a:lstStyle/>
+          <a:p>
+            <a:r>
+              <a:rPr lang="en-US" b="1" dirty="0" err="1" smtClean="0">
+                <a:solidFill>
+                  <a:schemeClr val="bg2">
+                    <a:lumMod val="10000"/>
+                  </a:schemeClr>
+                </a:solidFill>
+                <a:latin typeface="Century Gothic" panose="020B0502020202020204" pitchFamily="34" charset="0"/>
+              </a:rPr>
+              <a:t>Realisasi</a:t>
+            </a:r>
+            <a:r>
+              <a:rPr lang="en-US" b="1" dirty="0" smtClean="0">
+                <a:solidFill>
+                  <a:schemeClr val="bg2">
+                    <a:lumMod val="10000"/>
+                  </a:schemeClr>
+                </a:solidFill>
+                <a:latin typeface="Century Gothic" panose="020B0502020202020204" pitchFamily="34" charset="0"/>
+              </a:rPr>
+              <a:t> RPPL</a:t>
+            </a:r>
+            <a:endParaRPr lang="en-US" b="1" dirty="0">
+              <a:solidFill>
+                <a:schemeClr val="bg2">
+                  <a:lumMod val="10000"/>
+                </a:schemeClr>
+              </a:solidFill>
+              <a:latin typeface="Century Gothic" panose="020B0502020202020204" pitchFamily="34" charset="0"/>
+            </a:endParaRPr>
+          </a:p>
+        </p:txBody>
+      </p:sp>
+      <p:sp>
+        <p:nvSpPr>
+          <p:cNvPr id="12" name="TextBox 11"/>
+          <p:cNvSpPr txBox="1"/>
+          <p:nvPr/>
+        </p:nvSpPr>
+        <p:spPr>
+          <a:xfrm>
+            <a:off x="487816" y="1725592"/>
+            <a:ext cx="8797018" cy="461665"/>
+          </a:xfrm>
+          <a:prstGeom prst="rect">
+            <a:avLst/>
+          </a:prstGeom>
+          <a:noFill/>
+        </p:spPr>
+        <p:txBody>
+          <a:bodyPr wrap="square" rtlCol="0">
+            <a:spAutoFit/>
+          </a:bodyPr>
+          <a:lstStyle/>
+          <a:p>
+            <a:pPr lvl="0"/>
+            <a:r>
+              <a:rPr lang="en-US" sz="2400" u="sng" dirty="0" err="1" smtClean="0">
+                <a:solidFill>
+                  <a:schemeClr val="bg1"/>
+                </a:solidFill>
+              </a:rPr>
+              <a:t>Personil</a:t>
+            </a:r>
+            <a:r>
+              <a:rPr lang="en-US" sz="2400" u="sng" dirty="0" smtClean="0">
+                <a:solidFill>
+                  <a:schemeClr val="bg1"/>
+                </a:solidFill>
+              </a:rPr>
+              <a:t> + </a:t>
+            </a:r>
+            <a:r>
+              <a:rPr lang="en-US" sz="2400" u="sng" dirty="0" err="1" smtClean="0">
+                <a:solidFill>
+                  <a:schemeClr val="bg1"/>
+                </a:solidFill>
+              </a:rPr>
+              <a:t>Jobdesk</a:t>
+            </a:r>
+            <a:endParaRPr lang="en-US" sz="2400" u="sng" dirty="0" smtClean="0">
+              <a:solidFill>
+                <a:schemeClr val="bg1"/>
+              </a:solidFill>
+            </a:endParaRPr>
+          </a:p>
+        </p:txBody>
+      </p:sp>
+      <p:pic>
+        <p:nvPicPr>
           <p:cNvPr id="3" name="Picture 2"/>
           <p:cNvPicPr>
             <a:picLocks noChangeAspect="1"/>
           </p:cNvPicPr>
           <p:nvPr/>
         </p:nvPicPr>
-        <p:blipFill rotWithShape="1">
+        <p:blipFill>
           <a:blip r:embed="rId3"/>
-          <a:srcRect b="-1443"/>
-          <a:stretch/>
+          <a:stretch>
+            <a:fillRect/>
+          </a:stretch>
         </p:blipFill>
         <p:spPr>
           <a:xfrm>
-            <a:off x="389283" y="1629189"/>
-            <a:ext cx="6623700" cy="4890881"/>
+            <a:off x="604130" y="2391085"/>
+            <a:ext cx="2215612" cy="2440928"/>
           </a:xfrm>
           <a:prstGeom prst="rect">
             <a:avLst/>
@@ -4497,18 +4753,520 @@
         </p:blipFill>
         <p:spPr>
           <a:xfrm>
-            <a:off x="7116417" y="2469963"/>
-            <a:ext cx="4823791" cy="3502625"/>
+            <a:off x="672001" y="4832013"/>
+            <a:ext cx="2069420" cy="1553880"/>
           </a:xfrm>
           <a:prstGeom prst="rect">
             <a:avLst/>
           </a:prstGeom>
         </p:spPr>
       </p:pic>
+      <p:sp>
+        <p:nvSpPr>
+          <p:cNvPr id="5" name="TextBox 4"/>
+          <p:cNvSpPr txBox="1"/>
+          <p:nvPr/>
+        </p:nvSpPr>
+        <p:spPr>
+          <a:xfrm>
+            <a:off x="784022" y="6385585"/>
+            <a:ext cx="1845377" cy="369332"/>
+          </a:xfrm>
+          <a:prstGeom prst="rect">
+            <a:avLst/>
+          </a:prstGeom>
+          <a:noFill/>
+        </p:spPr>
+        <p:txBody>
+          <a:bodyPr wrap="none" rtlCol="0">
+            <a:spAutoFit/>
+          </a:bodyPr>
+          <a:lstStyle/>
+          <a:p>
+            <a:r>
+              <a:rPr lang="en-US" dirty="0" err="1" smtClean="0">
+                <a:solidFill>
+                  <a:schemeClr val="bg1"/>
+                </a:solidFill>
+              </a:rPr>
+              <a:t>Menurut</a:t>
+            </a:r>
+            <a:r>
+              <a:rPr lang="en-US" dirty="0" smtClean="0">
+                <a:solidFill>
+                  <a:schemeClr val="bg1"/>
+                </a:solidFill>
+              </a:rPr>
+              <a:t> timeline</a:t>
+            </a:r>
+            <a:endParaRPr lang="en-US" dirty="0">
+              <a:solidFill>
+                <a:schemeClr val="bg1"/>
+              </a:solidFill>
+            </a:endParaRPr>
+          </a:p>
+        </p:txBody>
+      </p:sp>
+      <p:pic>
+        <p:nvPicPr>
+          <p:cNvPr id="6" name="Picture 5"/>
+          <p:cNvPicPr>
+            <a:picLocks noChangeAspect="1"/>
+          </p:cNvPicPr>
+          <p:nvPr/>
+        </p:nvPicPr>
+        <p:blipFill rotWithShape="1">
+          <a:blip r:embed="rId5"/>
+          <a:srcRect b="33475"/>
+          <a:stretch/>
+        </p:blipFill>
+        <p:spPr>
+          <a:xfrm>
+            <a:off x="3478220" y="2410247"/>
+            <a:ext cx="3093796" cy="3136694"/>
+          </a:xfrm>
+          <a:prstGeom prst="rect">
+            <a:avLst/>
+          </a:prstGeom>
+        </p:spPr>
+      </p:pic>
+      <p:sp>
+        <p:nvSpPr>
+          <p:cNvPr id="13" name="TextBox 12"/>
+          <p:cNvSpPr txBox="1"/>
+          <p:nvPr/>
+        </p:nvSpPr>
+        <p:spPr>
+          <a:xfrm>
+            <a:off x="4730935" y="5546941"/>
+            <a:ext cx="1841081" cy="369332"/>
+          </a:xfrm>
+          <a:prstGeom prst="rect">
+            <a:avLst/>
+          </a:prstGeom>
+          <a:noFill/>
+        </p:spPr>
+        <p:txBody>
+          <a:bodyPr wrap="none" rtlCol="0">
+            <a:spAutoFit/>
+          </a:bodyPr>
+          <a:lstStyle/>
+          <a:p>
+            <a:r>
+              <a:rPr lang="en-US" dirty="0" err="1" smtClean="0">
+                <a:solidFill>
+                  <a:schemeClr val="bg1"/>
+                </a:solidFill>
+              </a:rPr>
+              <a:t>Jobdesk</a:t>
+            </a:r>
+            <a:r>
+              <a:rPr lang="en-US" dirty="0" smtClean="0">
+                <a:solidFill>
+                  <a:schemeClr val="bg1"/>
+                </a:solidFill>
+              </a:rPr>
+              <a:t> </a:t>
+            </a:r>
+            <a:r>
+              <a:rPr lang="en-US" dirty="0" err="1" smtClean="0">
+                <a:solidFill>
+                  <a:schemeClr val="bg1"/>
+                </a:solidFill>
+              </a:rPr>
+              <a:t>lapangan</a:t>
+            </a:r>
+            <a:endParaRPr lang="en-US" dirty="0">
+              <a:solidFill>
+                <a:schemeClr val="bg1"/>
+              </a:solidFill>
+            </a:endParaRPr>
+          </a:p>
+        </p:txBody>
+      </p:sp>
+      <p:pic>
+        <p:nvPicPr>
+          <p:cNvPr id="7" name="Picture 6"/>
+          <p:cNvPicPr>
+            <a:picLocks noChangeAspect="1"/>
+          </p:cNvPicPr>
+          <p:nvPr/>
+        </p:nvPicPr>
+        <p:blipFill>
+          <a:blip r:embed="rId6" cstate="print">
+            <a:extLst>
+              <a:ext uri="{28A0092B-C50C-407E-A947-70E740481C1C}">
+                <a14:useLocalDpi xmlns:a14="http://schemas.microsoft.com/office/drawing/2010/main" val="0"/>
+              </a:ext>
+            </a:extLst>
+          </a:blip>
+          <a:stretch>
+            <a:fillRect/>
+          </a:stretch>
+        </p:blipFill>
+        <p:spPr>
+          <a:xfrm>
+            <a:off x="7031229" y="2391085"/>
+            <a:ext cx="3407882" cy="2609662"/>
+          </a:xfrm>
+          <a:prstGeom prst="rect">
+            <a:avLst/>
+          </a:prstGeom>
+        </p:spPr>
+      </p:pic>
+      <p:sp>
+        <p:nvSpPr>
+          <p:cNvPr id="10" name="TextBox 9"/>
+          <p:cNvSpPr txBox="1"/>
+          <p:nvPr/>
+        </p:nvSpPr>
+        <p:spPr>
+          <a:xfrm>
+            <a:off x="8975505" y="5000747"/>
+            <a:ext cx="1463606" cy="369332"/>
+          </a:xfrm>
+          <a:prstGeom prst="rect">
+            <a:avLst/>
+          </a:prstGeom>
+          <a:noFill/>
+        </p:spPr>
+        <p:txBody>
+          <a:bodyPr wrap="none" rtlCol="0">
+            <a:spAutoFit/>
+          </a:bodyPr>
+          <a:lstStyle/>
+          <a:p>
+            <a:r>
+              <a:rPr lang="en-US" dirty="0" err="1" smtClean="0">
+                <a:solidFill>
+                  <a:schemeClr val="bg1"/>
+                </a:solidFill>
+              </a:rPr>
+              <a:t>Secara</a:t>
+            </a:r>
+            <a:r>
+              <a:rPr lang="en-US" dirty="0" smtClean="0">
+                <a:solidFill>
+                  <a:schemeClr val="bg1"/>
+                </a:solidFill>
+              </a:rPr>
+              <a:t> </a:t>
+            </a:r>
+            <a:r>
+              <a:rPr lang="en-US" dirty="0" err="1" smtClean="0">
+                <a:solidFill>
+                  <a:schemeClr val="bg1"/>
+                </a:solidFill>
+              </a:rPr>
+              <a:t>umum</a:t>
+            </a:r>
+            <a:endParaRPr lang="en-US" dirty="0">
+              <a:solidFill>
+                <a:schemeClr val="bg1"/>
+              </a:solidFill>
+            </a:endParaRPr>
+          </a:p>
+        </p:txBody>
+      </p:sp>
+      <p:sp>
+        <p:nvSpPr>
+          <p:cNvPr id="11" name="TextBox 10"/>
+          <p:cNvSpPr txBox="1"/>
+          <p:nvPr/>
+        </p:nvSpPr>
+        <p:spPr>
+          <a:xfrm>
+            <a:off x="9585963" y="6384884"/>
+            <a:ext cx="1263487" cy="369332"/>
+          </a:xfrm>
+          <a:prstGeom prst="rect">
+            <a:avLst/>
+          </a:prstGeom>
+          <a:noFill/>
+        </p:spPr>
+        <p:txBody>
+          <a:bodyPr wrap="none" rtlCol="0">
+            <a:spAutoFit/>
+          </a:bodyPr>
+          <a:lstStyle/>
+          <a:p>
+            <a:r>
+              <a:rPr lang="en-US" dirty="0" smtClean="0">
+                <a:solidFill>
+                  <a:schemeClr val="bg1"/>
+                </a:solidFill>
+              </a:rPr>
+              <a:t>TERLAMPIR</a:t>
+            </a:r>
+            <a:endParaRPr lang="en-US" dirty="0">
+              <a:solidFill>
+                <a:schemeClr val="bg1"/>
+              </a:solidFill>
+            </a:endParaRPr>
+          </a:p>
+        </p:txBody>
+      </p:sp>
     </p:spTree>
     <p:extLst>
       <p:ext uri="{BB962C8B-B14F-4D97-AF65-F5344CB8AC3E}">
-        <p14:creationId xmlns:p14="http://schemas.microsoft.com/office/powerpoint/2010/main" val="3541494613"/>
+        <p14:creationId xmlns:p14="http://schemas.microsoft.com/office/powerpoint/2010/main" val="221038785"/>
+      </p:ext>
+    </p:extLst>
+  </p:cSld>
+  <p:clrMapOvr>
+    <a:masterClrMapping/>
+  </p:clrMapOvr>
+  <p:timing>
+    <p:tnLst>
+      <p:par>
+        <p:cTn id="1" dur="indefinite" restart="never" nodeType="tmRoot"/>
+      </p:par>
+    </p:tnLst>
+  </p:timing>
+</p:sld>
+</file>
+
+<file path=ppt/slides/slide17.xml><?xml version="1.0" encoding="utf-8"?>
+<p:sld xmlns:a="http://schemas.openxmlformats.org/drawingml/2006/main" xmlns:r="http://schemas.openxmlformats.org/officeDocument/2006/relationships" xmlns:p="http://schemas.openxmlformats.org/presentationml/2006/main">
+  <p:cSld>
+    <p:bg>
+      <p:bgPr>
+        <a:blipFill dpi="0" rotWithShape="1">
+          <a:blip r:embed="rId2">
+            <a:lum/>
+          </a:blip>
+          <a:srcRect/>
+          <a:stretch>
+            <a:fillRect/>
+          </a:stretch>
+        </a:blipFill>
+        <a:effectLst/>
+      </p:bgPr>
+    </p:bg>
+    <p:spTree>
+      <p:nvGrpSpPr>
+        <p:cNvPr id="1" name=""/>
+        <p:cNvGrpSpPr/>
+        <p:nvPr/>
+      </p:nvGrpSpPr>
+      <p:grpSpPr>
+        <a:xfrm>
+          <a:off x="0" y="0"/>
+          <a:ext cx="0" cy="0"/>
+          <a:chOff x="0" y="0"/>
+          <a:chExt cx="0" cy="0"/>
+        </a:xfrm>
+      </p:grpSpPr>
+      <p:sp>
+        <p:nvSpPr>
+          <p:cNvPr id="2" name="Title 1"/>
+          <p:cNvSpPr>
+            <a:spLocks noGrp="1"/>
+          </p:cNvSpPr>
+          <p:nvPr>
+            <p:ph type="title"/>
+          </p:nvPr>
+        </p:nvSpPr>
+        <p:spPr>
+          <a:xfrm>
+            <a:off x="838200" y="365125"/>
+            <a:ext cx="10515600" cy="1044575"/>
+          </a:xfrm>
+        </p:spPr>
+        <p:txBody>
+          <a:bodyPr/>
+          <a:lstStyle/>
+          <a:p>
+            <a:r>
+              <a:rPr lang="en-US" b="1" dirty="0" err="1" smtClean="0">
+                <a:solidFill>
+                  <a:schemeClr val="bg2">
+                    <a:lumMod val="10000"/>
+                  </a:schemeClr>
+                </a:solidFill>
+                <a:latin typeface="Century Gothic" panose="020B0502020202020204" pitchFamily="34" charset="0"/>
+              </a:rPr>
+              <a:t>Kendala</a:t>
+            </a:r>
+            <a:r>
+              <a:rPr lang="en-US" b="1" dirty="0" smtClean="0">
+                <a:solidFill>
+                  <a:schemeClr val="bg2">
+                    <a:lumMod val="10000"/>
+                  </a:schemeClr>
+                </a:solidFill>
+                <a:latin typeface="Century Gothic" panose="020B0502020202020204" pitchFamily="34" charset="0"/>
+              </a:rPr>
+              <a:t> yang </a:t>
+            </a:r>
+            <a:r>
+              <a:rPr lang="en-US" b="1" dirty="0" err="1" smtClean="0">
+                <a:solidFill>
+                  <a:schemeClr val="bg2">
+                    <a:lumMod val="10000"/>
+                  </a:schemeClr>
+                </a:solidFill>
+                <a:latin typeface="Century Gothic" panose="020B0502020202020204" pitchFamily="34" charset="0"/>
+              </a:rPr>
+              <a:t>ditemui</a:t>
+            </a:r>
+            <a:endParaRPr lang="en-US" b="1" dirty="0">
+              <a:solidFill>
+                <a:schemeClr val="bg2">
+                  <a:lumMod val="10000"/>
+                </a:schemeClr>
+              </a:solidFill>
+              <a:latin typeface="Century Gothic" panose="020B0502020202020204" pitchFamily="34" charset="0"/>
+            </a:endParaRPr>
+          </a:p>
+        </p:txBody>
+      </p:sp>
+    </p:spTree>
+    <p:extLst>
+      <p:ext uri="{BB962C8B-B14F-4D97-AF65-F5344CB8AC3E}">
+        <p14:creationId xmlns:p14="http://schemas.microsoft.com/office/powerpoint/2010/main" val="2581203124"/>
+      </p:ext>
+    </p:extLst>
+  </p:cSld>
+  <p:clrMapOvr>
+    <a:masterClrMapping/>
+  </p:clrMapOvr>
+  <p:timing>
+    <p:tnLst>
+      <p:par>
+        <p:cTn id="1" dur="indefinite" restart="never" nodeType="tmRoot"/>
+      </p:par>
+    </p:tnLst>
+  </p:timing>
+</p:sld>
+</file>
+
+<file path=ppt/slides/slide18.xml><?xml version="1.0" encoding="utf-8"?>
+<p:sld xmlns:a="http://schemas.openxmlformats.org/drawingml/2006/main" xmlns:r="http://schemas.openxmlformats.org/officeDocument/2006/relationships" xmlns:p="http://schemas.openxmlformats.org/presentationml/2006/main">
+  <p:cSld>
+    <p:bg>
+      <p:bgPr>
+        <a:blipFill dpi="0" rotWithShape="1">
+          <a:blip r:embed="rId2">
+            <a:lum/>
+          </a:blip>
+          <a:srcRect/>
+          <a:stretch>
+            <a:fillRect/>
+          </a:stretch>
+        </a:blipFill>
+        <a:effectLst/>
+      </p:bgPr>
+    </p:bg>
+    <p:spTree>
+      <p:nvGrpSpPr>
+        <p:cNvPr id="1" name=""/>
+        <p:cNvGrpSpPr/>
+        <p:nvPr/>
+      </p:nvGrpSpPr>
+      <p:grpSpPr>
+        <a:xfrm>
+          <a:off x="0" y="0"/>
+          <a:ext cx="0" cy="0"/>
+          <a:chOff x="0" y="0"/>
+          <a:chExt cx="0" cy="0"/>
+        </a:xfrm>
+      </p:grpSpPr>
+      <p:sp>
+        <p:nvSpPr>
+          <p:cNvPr id="2" name="Title 1"/>
+          <p:cNvSpPr>
+            <a:spLocks noGrp="1"/>
+          </p:cNvSpPr>
+          <p:nvPr>
+            <p:ph type="title"/>
+          </p:nvPr>
+        </p:nvSpPr>
+        <p:spPr>
+          <a:xfrm>
+            <a:off x="838200" y="365125"/>
+            <a:ext cx="10515600" cy="1044575"/>
+          </a:xfrm>
+        </p:spPr>
+        <p:txBody>
+          <a:bodyPr/>
+          <a:lstStyle/>
+          <a:p>
+            <a:r>
+              <a:rPr lang="en-US" b="1" dirty="0" err="1" smtClean="0">
+                <a:solidFill>
+                  <a:schemeClr val="bg2">
+                    <a:lumMod val="10000"/>
+                  </a:schemeClr>
+                </a:solidFill>
+                <a:latin typeface="Century Gothic" panose="020B0502020202020204" pitchFamily="34" charset="0"/>
+              </a:rPr>
+              <a:t>Mekanisme</a:t>
+            </a:r>
+            <a:r>
+              <a:rPr lang="en-US" b="1" dirty="0" smtClean="0">
+                <a:solidFill>
+                  <a:schemeClr val="bg2">
+                    <a:lumMod val="10000"/>
+                  </a:schemeClr>
+                </a:solidFill>
+                <a:latin typeface="Century Gothic" panose="020B0502020202020204" pitchFamily="34" charset="0"/>
+              </a:rPr>
+              <a:t> Maintenance</a:t>
+            </a:r>
+            <a:endParaRPr lang="en-US" b="1" dirty="0">
+              <a:solidFill>
+                <a:schemeClr val="bg2">
+                  <a:lumMod val="10000"/>
+                </a:schemeClr>
+              </a:solidFill>
+              <a:latin typeface="Century Gothic" panose="020B0502020202020204" pitchFamily="34" charset="0"/>
+            </a:endParaRPr>
+          </a:p>
+        </p:txBody>
+      </p:sp>
+      <p:sp>
+        <p:nvSpPr>
+          <p:cNvPr id="3" name="TextBox 2"/>
+          <p:cNvSpPr txBox="1"/>
+          <p:nvPr/>
+        </p:nvSpPr>
+        <p:spPr>
+          <a:xfrm>
+            <a:off x="986971" y="1741714"/>
+            <a:ext cx="420308" cy="1015663"/>
+          </a:xfrm>
+          <a:prstGeom prst="rect">
+            <a:avLst/>
+          </a:prstGeom>
+          <a:noFill/>
+        </p:spPr>
+        <p:txBody>
+          <a:bodyPr wrap="none" rtlCol="0">
+            <a:spAutoFit/>
+          </a:bodyPr>
+          <a:lstStyle/>
+          <a:p>
+            <a:r>
+              <a:rPr lang="en-US" sz="6000" dirty="0" smtClean="0">
+                <a:solidFill>
+                  <a:schemeClr val="bg1"/>
+                </a:solidFill>
+              </a:rPr>
+              <a:t>-</a:t>
+            </a:r>
+            <a:endParaRPr lang="en-US" sz="6000" dirty="0">
+              <a:solidFill>
+                <a:schemeClr val="bg1"/>
+              </a:solidFill>
+            </a:endParaRPr>
+          </a:p>
+        </p:txBody>
+      </p:sp>
+    </p:spTree>
+    <p:extLst>
+      <p:ext uri="{BB962C8B-B14F-4D97-AF65-F5344CB8AC3E}">
+        <p14:creationId xmlns:p14="http://schemas.microsoft.com/office/powerpoint/2010/main" val="1030262555"/>
       </p:ext>
     </p:extLst>
   </p:cSld>

</xml_diff>

<commit_message>
Site Map, PPT + Site Map
</commit_message>
<xml_diff>
--- a/dokumen/PointerSchool.pptx
+++ b/dokumen/PointerSchool.pptx
@@ -121,6 +121,11 @@
       </a:defRPr>
     </a:lvl9pPr>
   </p:defaultTextStyle>
+  <p:extLst>
+    <p:ext uri="{EFAFB233-063F-42B5-8137-9DF3F51BA10A}">
+      <p15:sldGuideLst xmlns:p15="http://schemas.microsoft.com/office/powerpoint/2012/main"/>
+    </p:ext>
+  </p:extLst>
 </p:presentation>
 </file>
 
@@ -3612,6 +3617,30 @@
           </a:p>
         </p:txBody>
       </p:sp>
+      <p:pic>
+        <p:nvPicPr>
+          <p:cNvPr id="3" name="Picture 2"/>
+          <p:cNvPicPr>
+            <a:picLocks noChangeAspect="1"/>
+          </p:cNvPicPr>
+          <p:nvPr/>
+        </p:nvPicPr>
+        <p:blipFill>
+          <a:blip r:embed="rId3"/>
+          <a:stretch>
+            <a:fillRect/>
+          </a:stretch>
+        </p:blipFill>
+        <p:spPr>
+          <a:xfrm>
+            <a:off x="2304790" y="237996"/>
+            <a:ext cx="8530224" cy="6368682"/>
+          </a:xfrm>
+          <a:prstGeom prst="rect">
+            <a:avLst/>
+          </a:prstGeom>
+        </p:spPr>
+      </p:pic>
     </p:spTree>
     <p:extLst>
       <p:ext uri="{BB962C8B-B14F-4D97-AF65-F5344CB8AC3E}">
@@ -3750,6 +3779,30 @@
           </a:p>
         </p:txBody>
       </p:sp>
+      <p:pic>
+        <p:nvPicPr>
+          <p:cNvPr id="4" name="Picture 3"/>
+          <p:cNvPicPr>
+            <a:picLocks noChangeAspect="1"/>
+          </p:cNvPicPr>
+          <p:nvPr/>
+        </p:nvPicPr>
+        <p:blipFill>
+          <a:blip r:embed="rId3"/>
+          <a:stretch>
+            <a:fillRect/>
+          </a:stretch>
+        </p:blipFill>
+        <p:spPr>
+          <a:xfrm>
+            <a:off x="1063325" y="2299359"/>
+            <a:ext cx="10065349" cy="3161989"/>
+          </a:xfrm>
+          <a:prstGeom prst="rect">
+            <a:avLst/>
+          </a:prstGeom>
+        </p:spPr>
+      </p:pic>
     </p:spTree>
     <p:extLst>
       <p:ext uri="{BB962C8B-B14F-4D97-AF65-F5344CB8AC3E}">

</xml_diff>